<commit_message>
improve introduction of the camera and add FPSoC Localization Node section
</commit_message>
<xml_diff>
--- a/docs/_static/fpga-camera-figs/fpga-diagram-complete.pptx
+++ b/docs/_static/fpga-camera-figs/fpga-diagram-complete.pptx
@@ -106,7 +106,7 @@
   </p:defaultTextStyle>
   <p:extLst>
     <p:ext uri="{EFAFB233-063F-42B5-8137-9DF3F51BA10A}">
-      <p15:sldGuideLst xmlns:p15="http://schemas.microsoft.com/office/powerpoint/2012/main">
+      <p15:sldGuideLst xmlns:p15="http://schemas.microsoft.com/office/powerpoint/2012/main" xmlns="">
         <p15:guide id="1" orient="horz" pos="2160">
           <p15:clr>
             <a:srgbClr val="A4A3A4"/>
@@ -234,7 +234,7 @@
             <a:fld id="{80512062-9D2D-4A41-B732-10B0699BFABE}" type="datetime1">
               <a:rPr lang="es-ES"/>
               <a:pPr lvl="0"/>
-              <a:t>27/06/2018</a:t>
+              <a:t>10/11/2018</a:t>
             </a:fld>
             <a:endParaRPr lang="es-ES"/>
           </a:p>
@@ -285,7 +285,7 @@
           <a:p>
             <a:pPr lvl="0"/>
             <a:fld id="{7913A36C-2FE9-4F7D-AD6C-00CF56EC141F}" type="slidenum">
-              <a:t>‹Nº›</a:t>
+              <a:t>‹#›</a:t>
             </a:fld>
             <a:endParaRPr lang="es-ES"/>
           </a:p>
@@ -449,7 +449,7 @@
             <a:fld id="{D26708A4-9768-4FA6-BE54-A36C7B42000B}" type="datetime1">
               <a:rPr lang="es-ES"/>
               <a:pPr lvl="0"/>
-              <a:t>27/06/2018</a:t>
+              <a:t>10/11/2018</a:t>
             </a:fld>
             <a:endParaRPr lang="es-ES"/>
           </a:p>
@@ -500,7 +500,7 @@
           <a:p>
             <a:pPr lvl="0"/>
             <a:fld id="{2DDEFD71-1997-461B-B4DC-F6C0737E8D81}" type="slidenum">
-              <a:t>‹Nº›</a:t>
+              <a:t>‹#›</a:t>
             </a:fld>
             <a:endParaRPr lang="es-ES"/>
           </a:p>
@@ -673,7 +673,7 @@
             <a:fld id="{A43FC16E-FF57-4C5B-819D-FC9F2EE024D6}" type="datetime1">
               <a:rPr lang="es-ES"/>
               <a:pPr lvl="0"/>
-              <a:t>27/06/2018</a:t>
+              <a:t>10/11/2018</a:t>
             </a:fld>
             <a:endParaRPr lang="es-ES"/>
           </a:p>
@@ -724,7 +724,7 @@
           <a:p>
             <a:pPr lvl="0"/>
             <a:fld id="{669F5936-0A67-4AAC-A916-3B112528A10A}" type="slidenum">
-              <a:t>‹Nº›</a:t>
+              <a:t>‹#›</a:t>
             </a:fld>
             <a:endParaRPr lang="es-ES"/>
           </a:p>
@@ -887,7 +887,7 @@
             <a:fld id="{CBCBEAFA-9DFD-4EA5-AC7D-7975012BFB42}" type="datetime1">
               <a:rPr lang="es-ES"/>
               <a:pPr lvl="0"/>
-              <a:t>27/06/2018</a:t>
+              <a:t>10/11/2018</a:t>
             </a:fld>
             <a:endParaRPr lang="es-ES"/>
           </a:p>
@@ -938,7 +938,7 @@
           <a:p>
             <a:pPr lvl="0"/>
             <a:fld id="{2EE38332-F798-48AC-AB8A-8AC5D9BAC2CE}" type="slidenum">
-              <a:t>‹Nº›</a:t>
+              <a:t>‹#›</a:t>
             </a:fld>
             <a:endParaRPr lang="es-ES"/>
           </a:p>
@@ -1078,7 +1078,7 @@
             <a:fld id="{A504878C-E465-4B3A-A837-2B516E341B49}" type="datetime1">
               <a:rPr lang="es-ES"/>
               <a:pPr lvl="0"/>
-              <a:t>27/06/2018</a:t>
+              <a:t>10/11/2018</a:t>
             </a:fld>
             <a:endParaRPr lang="es-ES"/>
           </a:p>
@@ -1129,7 +1129,7 @@
           <a:p>
             <a:pPr lvl="0"/>
             <a:fld id="{781253D8-4F07-4D21-8497-C22CB948937F}" type="slidenum">
-              <a:t>‹Nº›</a:t>
+              <a:t>‹#›</a:t>
             </a:fld>
             <a:endParaRPr lang="es-ES"/>
           </a:p>
@@ -1400,7 +1400,7 @@
             <a:fld id="{C6874F89-F7AD-4988-BFA8-3B88B45F8E26}" type="datetime1">
               <a:rPr lang="es-ES"/>
               <a:pPr lvl="0"/>
-              <a:t>27/06/2018</a:t>
+              <a:t>10/11/2018</a:t>
             </a:fld>
             <a:endParaRPr lang="es-ES"/>
           </a:p>
@@ -1451,7 +1451,7 @@
           <a:p>
             <a:pPr lvl="0"/>
             <a:fld id="{59E45B8C-3B13-4AEC-97CC-D5D73C5B49BD}" type="slidenum">
-              <a:t>‹Nº›</a:t>
+              <a:t>‹#›</a:t>
             </a:fld>
             <a:endParaRPr lang="es-ES"/>
           </a:p>
@@ -1794,7 +1794,7 @@
             <a:fld id="{DA828D44-F66E-4FF5-9F51-AD545ABDDD50}" type="datetime1">
               <a:rPr lang="es-ES"/>
               <a:pPr lvl="0"/>
-              <a:t>27/06/2018</a:t>
+              <a:t>10/11/2018</a:t>
             </a:fld>
             <a:endParaRPr lang="es-ES"/>
           </a:p>
@@ -1845,7 +1845,7 @@
           <a:p>
             <a:pPr lvl="0"/>
             <a:fld id="{6A2E811E-F017-437D-88C2-5CB612153AAC}" type="slidenum">
-              <a:t>‹Nº›</a:t>
+              <a:t>‹#›</a:t>
             </a:fld>
             <a:endParaRPr lang="es-ES"/>
           </a:p>
@@ -1940,7 +1940,7 @@
             <a:fld id="{07A439F4-33A6-4D12-8F28-DC3D8BEAE60C}" type="datetime1">
               <a:rPr lang="es-ES"/>
               <a:pPr lvl="0"/>
-              <a:t>27/06/2018</a:t>
+              <a:t>10/11/2018</a:t>
             </a:fld>
             <a:endParaRPr lang="es-ES"/>
           </a:p>
@@ -1991,7 +1991,7 @@
           <a:p>
             <a:pPr lvl="0"/>
             <a:fld id="{E19C5DBA-A7F4-4ABD-BC37-9C0D4C566492}" type="slidenum">
-              <a:t>‹Nº›</a:t>
+              <a:t>‹#›</a:t>
             </a:fld>
             <a:endParaRPr lang="es-ES"/>
           </a:p>
@@ -2058,7 +2058,7 @@
             <a:fld id="{B714AA68-DF44-4F57-9A5A-963D7F3B65CA}" type="datetime1">
               <a:rPr lang="es-ES"/>
               <a:pPr lvl="0"/>
-              <a:t>27/06/2018</a:t>
+              <a:t>10/11/2018</a:t>
             </a:fld>
             <a:endParaRPr lang="es-ES"/>
           </a:p>
@@ -2109,7 +2109,7 @@
           <a:p>
             <a:pPr lvl="0"/>
             <a:fld id="{3B98F06E-301F-473A-9D01-0AE88F7B80E5}" type="slidenum">
-              <a:t>‹Nº›</a:t>
+              <a:t>‹#›</a:t>
             </a:fld>
             <a:endParaRPr lang="es-ES"/>
           </a:p>
@@ -2318,7 +2318,7 @@
             <a:fld id="{BBECBBA7-0B34-4824-9FCA-21C67B4270A8}" type="datetime1">
               <a:rPr lang="es-ES"/>
               <a:pPr lvl="0"/>
-              <a:t>27/06/2018</a:t>
+              <a:t>10/11/2018</a:t>
             </a:fld>
             <a:endParaRPr lang="es-ES"/>
           </a:p>
@@ -2369,7 +2369,7 @@
           <a:p>
             <a:pPr lvl="0"/>
             <a:fld id="{82397154-7239-441A-8F69-3745104BD340}" type="slidenum">
-              <a:t>‹Nº›</a:t>
+              <a:t>‹#›</a:t>
             </a:fld>
             <a:endParaRPr lang="es-ES"/>
           </a:p>
@@ -2535,7 +2535,7 @@
             <a:fld id="{FB6F2E0F-741B-40E6-97DD-8EDAEE10536B}" type="datetime1">
               <a:rPr lang="es-ES"/>
               <a:pPr lvl="0"/>
-              <a:t>27/06/2018</a:t>
+              <a:t>10/11/2018</a:t>
             </a:fld>
             <a:endParaRPr lang="es-ES"/>
           </a:p>
@@ -2586,7 +2586,7 @@
           <a:p>
             <a:pPr lvl="0"/>
             <a:fld id="{9CD591F2-ADE7-4A68-8658-5CB49CD78AF7}" type="slidenum">
-              <a:t>‹Nº›</a:t>
+              <a:t>‹#›</a:t>
             </a:fld>
             <a:endParaRPr lang="es-ES"/>
           </a:p>
@@ -2790,7 +2790,7 @@
             <a:fld id="{24762EBF-34CD-4933-BF72-36A3CB2A6772}" type="datetime1">
               <a:rPr lang="es-ES"/>
               <a:pPr lvl="0"/>
-              <a:t>27/06/2018</a:t>
+              <a:t>10/11/2018</a:t>
             </a:fld>
             <a:endParaRPr lang="es-ES"/>
           </a:p>
@@ -2899,7 +2899,7 @@
           <a:p>
             <a:pPr lvl="0"/>
             <a:fld id="{2C9614E4-57D1-49A6-A5A6-A6C074EF6530}" type="slidenum">
-              <a:t>‹Nº›</a:t>
+              <a:t>‹#›</a:t>
             </a:fld>
             <a:endParaRPr lang="es-ES"/>
           </a:p>
@@ -7576,15 +7576,42 @@
               </a:defRPr>
             </a:pPr>
             <a:r>
-              <a:rPr lang="es-ES" sz="1200" b="0" i="0" u="none" strike="noStrike" kern="1200" cap="none" spc="0" baseline="0">
-                <a:solidFill>
-                  <a:srgbClr val="000000"/>
-                </a:solidFill>
-                <a:uFillTx/>
-                <a:latin typeface="Calibri"/>
-              </a:rPr>
-              <a:t>Raw to RGB</a:t>
-            </a:r>
+              <a:rPr lang="es-ES" sz="1200" b="0" i="0" u="none" strike="noStrike" kern="1200" cap="none" spc="0" baseline="0" dirty="0" err="1" smtClean="0">
+                <a:solidFill>
+                  <a:srgbClr val="000000"/>
+                </a:solidFill>
+                <a:uFillTx/>
+                <a:latin typeface="Calibri"/>
+              </a:rPr>
+              <a:t>Frame</a:t>
+            </a:r>
+            <a:r>
+              <a:rPr lang="es-ES" sz="1200" b="0" i="0" u="none" strike="noStrike" kern="1200" cap="none" spc="0" baseline="0" dirty="0" smtClean="0">
+                <a:solidFill>
+                  <a:srgbClr val="000000"/>
+                </a:solidFill>
+                <a:uFillTx/>
+                <a:latin typeface="Calibri"/>
+              </a:rPr>
+              <a:t> </a:t>
+            </a:r>
+            <a:r>
+              <a:rPr lang="es-ES" sz="1200" b="0" i="0" u="none" strike="noStrike" kern="1200" cap="none" spc="0" baseline="0" dirty="0" err="1" smtClean="0">
+                <a:solidFill>
+                  <a:srgbClr val="000000"/>
+                </a:solidFill>
+                <a:uFillTx/>
+                <a:latin typeface="Calibri"/>
+              </a:rPr>
+              <a:t>Sync</a:t>
+            </a:r>
+            <a:endParaRPr lang="es-ES" sz="1200" b="0" i="0" u="none" strike="noStrike" kern="1200" cap="none" spc="0" baseline="0" dirty="0">
+              <a:solidFill>
+                <a:srgbClr val="000000"/>
+              </a:solidFill>
+              <a:uFillTx/>
+              <a:latin typeface="Calibri"/>
+            </a:endParaRPr>
           </a:p>
         </p:txBody>
       </p:sp>
@@ -8000,7 +8027,7 @@
         <p:spPr>
           <a:xfrm>
             <a:off x="4192288" y="4710858"/>
-            <a:ext cx="461986" cy="261610"/>
+            <a:ext cx="328936" cy="261610"/>
           </a:xfrm>
           <a:prstGeom prst="rect">
             <a:avLst/>
@@ -8043,7 +8070,7 @@
                 <a:uFillTx/>
                 <a:latin typeface="Calibri"/>
               </a:rPr>
-              <a:t>3x12</a:t>
+              <a:t>12</a:t>
             </a:r>
             <a:endParaRPr lang="es-ES" sz="1100" b="0" i="0" u="none" strike="noStrike" kern="1200" cap="none" spc="0" baseline="0" dirty="0">
               <a:solidFill>
@@ -8817,7 +8844,7 @@
         </p:nvCxnSpPr>
         <p:spPr>
           <a:xfrm flipV="1">
-            <a:off x="4084579" y="5160251"/>
+            <a:off x="5132957" y="5154760"/>
             <a:ext cx="0" cy="117089"/>
           </a:xfrm>
           <a:prstGeom prst="straightConnector1">
@@ -8841,7 +8868,7 @@
         </p:nvSpPr>
         <p:spPr>
           <a:xfrm>
-            <a:off x="3904085" y="5193188"/>
+            <a:off x="4952463" y="5187697"/>
             <a:ext cx="360995" cy="246220"/>
           </a:xfrm>
           <a:prstGeom prst="rect">
@@ -15018,44 +15045,37 @@
                 <a:uFillTx/>
                 <a:latin typeface="Calibri"/>
               </a:rPr>
-              <a:t>Frame</a:t>
-            </a:r>
-            <a:endParaRPr lang="es-ES" sz="1200" b="0" i="0" u="none" strike="noStrike" kern="1200" cap="none" spc="0" baseline="0" dirty="0" smtClean="0">
-              <a:solidFill>
-                <a:srgbClr val="000000"/>
-              </a:solidFill>
-              <a:uFillTx/>
-              <a:latin typeface="Calibri"/>
-            </a:endParaRPr>
-          </a:p>
-          <a:p>
-            <a:pPr marL="0" marR="0" lvl="0" indent="0" algn="ctr" defTabSz="914400" rtl="0" fontAlgn="auto" hangingPunct="1">
-              <a:lnSpc>
-                <a:spcPct val="100000"/>
-              </a:lnSpc>
-              <a:spcBef>
-                <a:spcPts val="0"/>
-              </a:spcBef>
-              <a:spcAft>
-                <a:spcPts val="0"/>
-              </a:spcAft>
-              <a:buNone/>
-              <a:tabLst/>
-              <a:defRPr sz="1800" b="0" i="0" u="none" strike="noStrike" kern="0" cap="none" spc="0" baseline="0">
-                <a:solidFill>
-                  <a:srgbClr val="000000"/>
-                </a:solidFill>
-                <a:uFillTx/>
-              </a:defRPr>
-            </a:pPr>
-            <a:r>
-              <a:rPr lang="es-ES" sz="1200" dirty="0" err="1" smtClean="0">
-                <a:solidFill>
-                  <a:srgbClr val="000000"/>
-                </a:solidFill>
-                <a:latin typeface="Calibri"/>
-              </a:rPr>
-              <a:t>Sync</a:t>
+              <a:t>Raw</a:t>
+            </a:r>
+            <a:r>
+              <a:rPr lang="es-ES" sz="1200" b="0" i="0" u="none" strike="noStrike" kern="1200" cap="none" spc="0" baseline="0" dirty="0" smtClean="0">
+                <a:solidFill>
+                  <a:srgbClr val="000000"/>
+                </a:solidFill>
+                <a:uFillTx/>
+                <a:latin typeface="Calibri"/>
+              </a:rPr>
+              <a:t> </a:t>
+            </a:r>
+            <a:r>
+              <a:rPr lang="es-ES" sz="1200" b="0" i="0" u="none" strike="noStrike" kern="1200" cap="none" spc="0" baseline="0" dirty="0" err="1" smtClean="0">
+                <a:solidFill>
+                  <a:srgbClr val="000000"/>
+                </a:solidFill>
+                <a:uFillTx/>
+                <a:latin typeface="Calibri"/>
+              </a:rPr>
+              <a:t>to</a:t>
+            </a:r>
+            <a:r>
+              <a:rPr lang="es-ES" sz="1200" b="0" i="0" u="none" strike="noStrike" kern="1200" cap="none" spc="0" baseline="0" dirty="0" smtClean="0">
+                <a:solidFill>
+                  <a:srgbClr val="000000"/>
+                </a:solidFill>
+                <a:uFillTx/>
+                <a:latin typeface="Calibri"/>
+              </a:rPr>
+              <a:t> RGB</a:t>
             </a:r>
             <a:endParaRPr lang="es-ES" sz="1200" b="0" i="0" u="none" strike="noStrike" kern="1200" cap="none" spc="0" baseline="0" dirty="0">
               <a:solidFill>
@@ -15235,76 +15255,16 @@
           </a:ln>
         </p:spPr>
       </p:cxnSp>
-      <p:sp>
-        <p:nvSpPr>
-          <p:cNvPr id="109" name="TextBox 245"/>
-          <p:cNvSpPr txBox="1"/>
-          <p:nvPr/>
-        </p:nvSpPr>
-        <p:spPr>
-          <a:xfrm>
-            <a:off x="4186613" y="4596432"/>
-            <a:ext cx="428323" cy="261609"/>
-          </a:xfrm>
-          <a:prstGeom prst="rect">
-            <a:avLst/>
-          </a:prstGeom>
-          <a:noFill/>
-          <a:ln>
-            <a:noFill/>
-          </a:ln>
-        </p:spPr>
-        <p:txBody>
-          <a:bodyPr vert="horz" wrap="none" lIns="91440" tIns="45720" rIns="91440" bIns="45720" anchor="t" anchorCtr="0" compatLnSpc="1">
-            <a:spAutoFit/>
-          </a:bodyPr>
-          <a:lstStyle/>
-          <a:p>
-            <a:pPr marL="0" marR="0" lvl="0" indent="0" algn="l" defTabSz="914400" rtl="0" fontAlgn="auto" hangingPunct="1">
-              <a:lnSpc>
-                <a:spcPct val="100000"/>
-              </a:lnSpc>
-              <a:spcBef>
-                <a:spcPts val="0"/>
-              </a:spcBef>
-              <a:spcAft>
-                <a:spcPts val="0"/>
-              </a:spcAft>
-              <a:buNone/>
-              <a:tabLst/>
-              <a:defRPr sz="1800" b="0" i="0" u="none" strike="noStrike" kern="0" cap="none" spc="0" baseline="0">
-                <a:solidFill>
-                  <a:srgbClr val="000000"/>
-                </a:solidFill>
-                <a:uFillTx/>
-              </a:defRPr>
-            </a:pPr>
-            <a:r>
-              <a:rPr lang="es-ES" sz="1100" b="0" i="0" u="none" strike="noStrike" kern="1200" cap="none" spc="0" baseline="0" dirty="0">
-                <a:solidFill>
-                  <a:srgbClr val="000000"/>
-                </a:solidFill>
-                <a:uFillTx/>
-                <a:latin typeface="Calibri"/>
-              </a:rPr>
-              <a:t>RGB</a:t>
-            </a:r>
-          </a:p>
-        </p:txBody>
-      </p:sp>
       <p:cxnSp>
         <p:nvCxnSpPr>
           <p:cNvPr id="98" name="Straight Arrow Connector 93"/>
-          <p:cNvCxnSpPr>
-            <a:stCxn id="97" idx="3"/>
-            <a:endCxn id="319" idx="1"/>
-          </p:cNvCxnSpPr>
+          <p:cNvCxnSpPr/>
           <p:nvPr/>
         </p:nvCxnSpPr>
         <p:spPr>
           <a:xfrm>
-            <a:off x="4237891" y="4950547"/>
-            <a:ext cx="372587" cy="9186"/>
+            <a:off x="4244315" y="4956050"/>
+            <a:ext cx="366163" cy="1"/>
           </a:xfrm>
           <a:prstGeom prst="straightConnector1">
             <a:avLst/>

</xml_diff>